<commit_message>
ready for mid defence
</commit_message>
<xml_diff>
--- a/Documents/Mid Defence/mid defence.pptx
+++ b/Documents/Mid Defence/mid defence.pptx
@@ -3258,10 +3258,10 @@
       </p:grpSpPr>
       <p:pic>
         <p:nvPicPr>
-          <p:cNvPr id="12" name="Picture 11">
+          <p:cNvPr id="7" name="Picture 6">
             <a:extLst>
               <a:ext uri="{FF2B5EF4-FFF2-40B4-BE49-F238E27FC236}">
-                <a16:creationId xmlns:a16="http://schemas.microsoft.com/office/drawing/2014/main" id="{DA9C5175-D0B6-04E4-1C93-15851C92F041}"/>
+                <a16:creationId xmlns:a16="http://schemas.microsoft.com/office/drawing/2014/main" id="{BD7E9631-2EF6-3D5C-470D-E6262B4B48DC}"/>
               </a:ext>
             </a:extLst>
           </p:cNvPr>
@@ -3278,8 +3278,8 @@
         </p:blipFill>
         <p:spPr>
           <a:xfrm>
-            <a:off x="2895600" y="1238250"/>
-            <a:ext cx="9677400" cy="6591300"/>
+            <a:off x="1600200" y="1009650"/>
+            <a:ext cx="13391003" cy="6477000"/>
           </a:xfrm>
           <a:prstGeom prst="rect">
             <a:avLst/>

</xml_diff>